<commit_message>
chore: remove useless info
</commit_message>
<xml_diff>
--- a/organisation.pptx
+++ b/organisation.pptx
@@ -156,7 +156,7 @@
           </a:lstStyle>
           <a:p>
             <a:r>
-              <a:rPr lang="fr-FR" smtClean="0"/>
+              <a:rPr lang="fr-FR"/>
               <a:t>Modifiez le style du titre</a:t>
             </a:r>
             <a:endParaRPr lang="en-US" dirty="0"/>
@@ -221,7 +221,7 @@
           </a:lstStyle>
           <a:p>
             <a:r>
-              <a:rPr lang="fr-FR" smtClean="0"/>
+              <a:rPr lang="fr-FR"/>
               <a:t>Modifier le style des sous-titres du masque</a:t>
             </a:r>
             <a:endParaRPr lang="en-US" dirty="0"/>
@@ -245,7 +245,7 @@
           <a:p>
             <a:fld id="{1BB3E4DA-C71C-4ED9-866F-5A0278C77694}" type="datetimeFigureOut">
               <a:rPr lang="fr-FR" smtClean="0"/>
-              <a:t>13/01/2023</a:t>
+              <a:t>17/05/2023</a:t>
             </a:fld>
             <a:endParaRPr lang="fr-FR"/>
           </a:p>
@@ -339,7 +339,7 @@
           <a:lstStyle/>
           <a:p>
             <a:r>
-              <a:rPr lang="fr-FR" smtClean="0"/>
+              <a:rPr lang="fr-FR"/>
               <a:t>Modifiez le style du titre</a:t>
             </a:r>
             <a:endParaRPr lang="en-US" dirty="0"/>
@@ -363,35 +363,35 @@
           <a:p>
             <a:pPr lvl="0"/>
             <a:r>
-              <a:rPr lang="fr-FR" smtClean="0"/>
+              <a:rPr lang="fr-FR"/>
               <a:t>Modifier les styles du texte du masque</a:t>
             </a:r>
           </a:p>
           <a:p>
             <a:pPr lvl="1"/>
             <a:r>
-              <a:rPr lang="fr-FR" smtClean="0"/>
+              <a:rPr lang="fr-FR"/>
               <a:t>Deuxième niveau</a:t>
             </a:r>
           </a:p>
           <a:p>
             <a:pPr lvl="2"/>
             <a:r>
-              <a:rPr lang="fr-FR" smtClean="0"/>
+              <a:rPr lang="fr-FR"/>
               <a:t>Troisième niveau</a:t>
             </a:r>
           </a:p>
           <a:p>
             <a:pPr lvl="3"/>
             <a:r>
-              <a:rPr lang="fr-FR" smtClean="0"/>
+              <a:rPr lang="fr-FR"/>
               <a:t>Quatrième niveau</a:t>
             </a:r>
           </a:p>
           <a:p>
             <a:pPr lvl="4"/>
             <a:r>
-              <a:rPr lang="fr-FR" smtClean="0"/>
+              <a:rPr lang="fr-FR"/>
               <a:t>Cinquième niveau</a:t>
             </a:r>
             <a:endParaRPr lang="en-US" dirty="0"/>
@@ -415,7 +415,7 @@
           <a:p>
             <a:fld id="{1BB3E4DA-C71C-4ED9-866F-5A0278C77694}" type="datetimeFigureOut">
               <a:rPr lang="fr-FR" smtClean="0"/>
-              <a:t>13/01/2023</a:t>
+              <a:t>17/05/2023</a:t>
             </a:fld>
             <a:endParaRPr lang="fr-FR"/>
           </a:p>
@@ -514,7 +514,7 @@
           <a:lstStyle/>
           <a:p>
             <a:r>
-              <a:rPr lang="fr-FR" smtClean="0"/>
+              <a:rPr lang="fr-FR"/>
               <a:t>Modifiez le style du titre</a:t>
             </a:r>
             <a:endParaRPr lang="en-US" dirty="0"/>
@@ -543,35 +543,35 @@
           <a:p>
             <a:pPr lvl="0"/>
             <a:r>
-              <a:rPr lang="fr-FR" smtClean="0"/>
+              <a:rPr lang="fr-FR"/>
               <a:t>Modifier les styles du texte du masque</a:t>
             </a:r>
           </a:p>
           <a:p>
             <a:pPr lvl="1"/>
             <a:r>
-              <a:rPr lang="fr-FR" smtClean="0"/>
+              <a:rPr lang="fr-FR"/>
               <a:t>Deuxième niveau</a:t>
             </a:r>
           </a:p>
           <a:p>
             <a:pPr lvl="2"/>
             <a:r>
-              <a:rPr lang="fr-FR" smtClean="0"/>
+              <a:rPr lang="fr-FR"/>
               <a:t>Troisième niveau</a:t>
             </a:r>
           </a:p>
           <a:p>
             <a:pPr lvl="3"/>
             <a:r>
-              <a:rPr lang="fr-FR" smtClean="0"/>
+              <a:rPr lang="fr-FR"/>
               <a:t>Quatrième niveau</a:t>
             </a:r>
           </a:p>
           <a:p>
             <a:pPr lvl="4"/>
             <a:r>
-              <a:rPr lang="fr-FR" smtClean="0"/>
+              <a:rPr lang="fr-FR"/>
               <a:t>Cinquième niveau</a:t>
             </a:r>
             <a:endParaRPr lang="en-US" dirty="0"/>
@@ -595,7 +595,7 @@
           <a:p>
             <a:fld id="{1BB3E4DA-C71C-4ED9-866F-5A0278C77694}" type="datetimeFigureOut">
               <a:rPr lang="fr-FR" smtClean="0"/>
-              <a:t>13/01/2023</a:t>
+              <a:t>17/05/2023</a:t>
             </a:fld>
             <a:endParaRPr lang="fr-FR"/>
           </a:p>
@@ -689,7 +689,7 @@
           <a:lstStyle/>
           <a:p>
             <a:r>
-              <a:rPr lang="fr-FR" smtClean="0"/>
+              <a:rPr lang="fr-FR"/>
               <a:t>Modifiez le style du titre</a:t>
             </a:r>
             <a:endParaRPr lang="en-US" dirty="0"/>
@@ -713,35 +713,35 @@
           <a:p>
             <a:pPr lvl="0"/>
             <a:r>
-              <a:rPr lang="fr-FR" smtClean="0"/>
+              <a:rPr lang="fr-FR"/>
               <a:t>Modifier les styles du texte du masque</a:t>
             </a:r>
           </a:p>
           <a:p>
             <a:pPr lvl="1"/>
             <a:r>
-              <a:rPr lang="fr-FR" smtClean="0"/>
+              <a:rPr lang="fr-FR"/>
               <a:t>Deuxième niveau</a:t>
             </a:r>
           </a:p>
           <a:p>
             <a:pPr lvl="2"/>
             <a:r>
-              <a:rPr lang="fr-FR" smtClean="0"/>
+              <a:rPr lang="fr-FR"/>
               <a:t>Troisième niveau</a:t>
             </a:r>
           </a:p>
           <a:p>
             <a:pPr lvl="3"/>
             <a:r>
-              <a:rPr lang="fr-FR" smtClean="0"/>
+              <a:rPr lang="fr-FR"/>
               <a:t>Quatrième niveau</a:t>
             </a:r>
           </a:p>
           <a:p>
             <a:pPr lvl="4"/>
             <a:r>
-              <a:rPr lang="fr-FR" smtClean="0"/>
+              <a:rPr lang="fr-FR"/>
               <a:t>Cinquième niveau</a:t>
             </a:r>
             <a:endParaRPr lang="en-US" dirty="0"/>
@@ -765,7 +765,7 @@
           <a:p>
             <a:fld id="{1BB3E4DA-C71C-4ED9-866F-5A0278C77694}" type="datetimeFigureOut">
               <a:rPr lang="fr-FR" smtClean="0"/>
-              <a:t>13/01/2023</a:t>
+              <a:t>17/05/2023</a:t>
             </a:fld>
             <a:endParaRPr lang="fr-FR"/>
           </a:p>
@@ -868,7 +868,7 @@
           </a:lstStyle>
           <a:p>
             <a:r>
-              <a:rPr lang="fr-FR" smtClean="0"/>
+              <a:rPr lang="fr-FR"/>
               <a:t>Modifiez le style du titre</a:t>
             </a:r>
             <a:endParaRPr lang="en-US" dirty="0"/>
@@ -986,7 +986,7 @@
           <a:p>
             <a:pPr lvl="0"/>
             <a:r>
-              <a:rPr lang="fr-FR" smtClean="0"/>
+              <a:rPr lang="fr-FR"/>
               <a:t>Modifier les styles du texte du masque</a:t>
             </a:r>
           </a:p>
@@ -1009,7 +1009,7 @@
           <a:p>
             <a:fld id="{1BB3E4DA-C71C-4ED9-866F-5A0278C77694}" type="datetimeFigureOut">
               <a:rPr lang="fr-FR" smtClean="0"/>
-              <a:t>13/01/2023</a:t>
+              <a:t>17/05/2023</a:t>
             </a:fld>
             <a:endParaRPr lang="fr-FR"/>
           </a:p>
@@ -1103,7 +1103,7 @@
           <a:lstStyle/>
           <a:p>
             <a:r>
-              <a:rPr lang="fr-FR" smtClean="0"/>
+              <a:rPr lang="fr-FR"/>
               <a:t>Modifiez le style du titre</a:t>
             </a:r>
             <a:endParaRPr lang="en-US" dirty="0"/>
@@ -1132,35 +1132,35 @@
           <a:p>
             <a:pPr lvl="0"/>
             <a:r>
-              <a:rPr lang="fr-FR" smtClean="0"/>
+              <a:rPr lang="fr-FR"/>
               <a:t>Modifier les styles du texte du masque</a:t>
             </a:r>
           </a:p>
           <a:p>
             <a:pPr lvl="1"/>
             <a:r>
-              <a:rPr lang="fr-FR" smtClean="0"/>
+              <a:rPr lang="fr-FR"/>
               <a:t>Deuxième niveau</a:t>
             </a:r>
           </a:p>
           <a:p>
             <a:pPr lvl="2"/>
             <a:r>
-              <a:rPr lang="fr-FR" smtClean="0"/>
+              <a:rPr lang="fr-FR"/>
               <a:t>Troisième niveau</a:t>
             </a:r>
           </a:p>
           <a:p>
             <a:pPr lvl="3"/>
             <a:r>
-              <a:rPr lang="fr-FR" smtClean="0"/>
+              <a:rPr lang="fr-FR"/>
               <a:t>Quatrième niveau</a:t>
             </a:r>
           </a:p>
           <a:p>
             <a:pPr lvl="4"/>
             <a:r>
-              <a:rPr lang="fr-FR" smtClean="0"/>
+              <a:rPr lang="fr-FR"/>
               <a:t>Cinquième niveau</a:t>
             </a:r>
             <a:endParaRPr lang="en-US" dirty="0"/>
@@ -1189,35 +1189,35 @@
           <a:p>
             <a:pPr lvl="0"/>
             <a:r>
-              <a:rPr lang="fr-FR" smtClean="0"/>
+              <a:rPr lang="fr-FR"/>
               <a:t>Modifier les styles du texte du masque</a:t>
             </a:r>
           </a:p>
           <a:p>
             <a:pPr lvl="1"/>
             <a:r>
-              <a:rPr lang="fr-FR" smtClean="0"/>
+              <a:rPr lang="fr-FR"/>
               <a:t>Deuxième niveau</a:t>
             </a:r>
           </a:p>
           <a:p>
             <a:pPr lvl="2"/>
             <a:r>
-              <a:rPr lang="fr-FR" smtClean="0"/>
+              <a:rPr lang="fr-FR"/>
               <a:t>Troisième niveau</a:t>
             </a:r>
           </a:p>
           <a:p>
             <a:pPr lvl="3"/>
             <a:r>
-              <a:rPr lang="fr-FR" smtClean="0"/>
+              <a:rPr lang="fr-FR"/>
               <a:t>Quatrième niveau</a:t>
             </a:r>
           </a:p>
           <a:p>
             <a:pPr lvl="4"/>
             <a:r>
-              <a:rPr lang="fr-FR" smtClean="0"/>
+              <a:rPr lang="fr-FR"/>
               <a:t>Cinquième niveau</a:t>
             </a:r>
             <a:endParaRPr lang="en-US" dirty="0"/>
@@ -1241,7 +1241,7 @@
           <a:p>
             <a:fld id="{1BB3E4DA-C71C-4ED9-866F-5A0278C77694}" type="datetimeFigureOut">
               <a:rPr lang="fr-FR" smtClean="0"/>
-              <a:t>13/01/2023</a:t>
+              <a:t>17/05/2023</a:t>
             </a:fld>
             <a:endParaRPr lang="fr-FR"/>
           </a:p>
@@ -1340,7 +1340,7 @@
           <a:lstStyle/>
           <a:p>
             <a:r>
-              <a:rPr lang="fr-FR" smtClean="0"/>
+              <a:rPr lang="fr-FR"/>
               <a:t>Modifiez le style du titre</a:t>
             </a:r>
             <a:endParaRPr lang="en-US" dirty="0"/>
@@ -1406,7 +1406,7 @@
           <a:p>
             <a:pPr lvl="0"/>
             <a:r>
-              <a:rPr lang="fr-FR" smtClean="0"/>
+              <a:rPr lang="fr-FR"/>
               <a:t>Modifier les styles du texte du masque</a:t>
             </a:r>
           </a:p>
@@ -1434,35 +1434,35 @@
           <a:p>
             <a:pPr lvl="0"/>
             <a:r>
-              <a:rPr lang="fr-FR" smtClean="0"/>
+              <a:rPr lang="fr-FR"/>
               <a:t>Modifier les styles du texte du masque</a:t>
             </a:r>
           </a:p>
           <a:p>
             <a:pPr lvl="1"/>
             <a:r>
-              <a:rPr lang="fr-FR" smtClean="0"/>
+              <a:rPr lang="fr-FR"/>
               <a:t>Deuxième niveau</a:t>
             </a:r>
           </a:p>
           <a:p>
             <a:pPr lvl="2"/>
             <a:r>
-              <a:rPr lang="fr-FR" smtClean="0"/>
+              <a:rPr lang="fr-FR"/>
               <a:t>Troisième niveau</a:t>
             </a:r>
           </a:p>
           <a:p>
             <a:pPr lvl="3"/>
             <a:r>
-              <a:rPr lang="fr-FR" smtClean="0"/>
+              <a:rPr lang="fr-FR"/>
               <a:t>Quatrième niveau</a:t>
             </a:r>
           </a:p>
           <a:p>
             <a:pPr lvl="4"/>
             <a:r>
-              <a:rPr lang="fr-FR" smtClean="0"/>
+              <a:rPr lang="fr-FR"/>
               <a:t>Cinquième niveau</a:t>
             </a:r>
             <a:endParaRPr lang="en-US" dirty="0"/>
@@ -1528,7 +1528,7 @@
           <a:p>
             <a:pPr lvl="0"/>
             <a:r>
-              <a:rPr lang="fr-FR" smtClean="0"/>
+              <a:rPr lang="fr-FR"/>
               <a:t>Modifier les styles du texte du masque</a:t>
             </a:r>
           </a:p>
@@ -1556,35 +1556,35 @@
           <a:p>
             <a:pPr lvl="0"/>
             <a:r>
-              <a:rPr lang="fr-FR" smtClean="0"/>
+              <a:rPr lang="fr-FR"/>
               <a:t>Modifier les styles du texte du masque</a:t>
             </a:r>
           </a:p>
           <a:p>
             <a:pPr lvl="1"/>
             <a:r>
-              <a:rPr lang="fr-FR" smtClean="0"/>
+              <a:rPr lang="fr-FR"/>
               <a:t>Deuxième niveau</a:t>
             </a:r>
           </a:p>
           <a:p>
             <a:pPr lvl="2"/>
             <a:r>
-              <a:rPr lang="fr-FR" smtClean="0"/>
+              <a:rPr lang="fr-FR"/>
               <a:t>Troisième niveau</a:t>
             </a:r>
           </a:p>
           <a:p>
             <a:pPr lvl="3"/>
             <a:r>
-              <a:rPr lang="fr-FR" smtClean="0"/>
+              <a:rPr lang="fr-FR"/>
               <a:t>Quatrième niveau</a:t>
             </a:r>
           </a:p>
           <a:p>
             <a:pPr lvl="4"/>
             <a:r>
-              <a:rPr lang="fr-FR" smtClean="0"/>
+              <a:rPr lang="fr-FR"/>
               <a:t>Cinquième niveau</a:t>
             </a:r>
             <a:endParaRPr lang="en-US" dirty="0"/>
@@ -1608,7 +1608,7 @@
           <a:p>
             <a:fld id="{1BB3E4DA-C71C-4ED9-866F-5A0278C77694}" type="datetimeFigureOut">
               <a:rPr lang="fr-FR" smtClean="0"/>
-              <a:t>13/01/2023</a:t>
+              <a:t>17/05/2023</a:t>
             </a:fld>
             <a:endParaRPr lang="fr-FR"/>
           </a:p>
@@ -1702,7 +1702,7 @@
           <a:lstStyle/>
           <a:p>
             <a:r>
-              <a:rPr lang="fr-FR" smtClean="0"/>
+              <a:rPr lang="fr-FR"/>
               <a:t>Modifiez le style du titre</a:t>
             </a:r>
             <a:endParaRPr lang="en-US" dirty="0"/>
@@ -1726,7 +1726,7 @@
           <a:p>
             <a:fld id="{1BB3E4DA-C71C-4ED9-866F-5A0278C77694}" type="datetimeFigureOut">
               <a:rPr lang="fr-FR" smtClean="0"/>
-              <a:t>13/01/2023</a:t>
+              <a:t>17/05/2023</a:t>
             </a:fld>
             <a:endParaRPr lang="fr-FR"/>
           </a:p>
@@ -1821,7 +1821,7 @@
           <a:p>
             <a:fld id="{1BB3E4DA-C71C-4ED9-866F-5A0278C77694}" type="datetimeFigureOut">
               <a:rPr lang="fr-FR" smtClean="0"/>
-              <a:t>13/01/2023</a:t>
+              <a:t>17/05/2023</a:t>
             </a:fld>
             <a:endParaRPr lang="fr-FR"/>
           </a:p>
@@ -1924,7 +1924,7 @@
           </a:lstStyle>
           <a:p>
             <a:r>
-              <a:rPr lang="fr-FR" smtClean="0"/>
+              <a:rPr lang="fr-FR"/>
               <a:t>Modifiez le style du titre</a:t>
             </a:r>
             <a:endParaRPr lang="en-US" dirty="0"/>
@@ -1981,35 +1981,35 @@
           <a:p>
             <a:pPr lvl="0"/>
             <a:r>
-              <a:rPr lang="fr-FR" smtClean="0"/>
+              <a:rPr lang="fr-FR"/>
               <a:t>Modifier les styles du texte du masque</a:t>
             </a:r>
           </a:p>
           <a:p>
             <a:pPr lvl="1"/>
             <a:r>
-              <a:rPr lang="fr-FR" smtClean="0"/>
+              <a:rPr lang="fr-FR"/>
               <a:t>Deuxième niveau</a:t>
             </a:r>
           </a:p>
           <a:p>
             <a:pPr lvl="2"/>
             <a:r>
-              <a:rPr lang="fr-FR" smtClean="0"/>
+              <a:rPr lang="fr-FR"/>
               <a:t>Troisième niveau</a:t>
             </a:r>
           </a:p>
           <a:p>
             <a:pPr lvl="3"/>
             <a:r>
-              <a:rPr lang="fr-FR" smtClean="0"/>
+              <a:rPr lang="fr-FR"/>
               <a:t>Quatrième niveau</a:t>
             </a:r>
           </a:p>
           <a:p>
             <a:pPr lvl="4"/>
             <a:r>
-              <a:rPr lang="fr-FR" smtClean="0"/>
+              <a:rPr lang="fr-FR"/>
               <a:t>Cinquième niveau</a:t>
             </a:r>
             <a:endParaRPr lang="en-US" dirty="0"/>
@@ -2075,7 +2075,7 @@
           <a:p>
             <a:pPr lvl="0"/>
             <a:r>
-              <a:rPr lang="fr-FR" smtClean="0"/>
+              <a:rPr lang="fr-FR"/>
               <a:t>Modifier les styles du texte du masque</a:t>
             </a:r>
           </a:p>
@@ -2098,7 +2098,7 @@
           <a:p>
             <a:fld id="{1BB3E4DA-C71C-4ED9-866F-5A0278C77694}" type="datetimeFigureOut">
               <a:rPr lang="fr-FR" smtClean="0"/>
-              <a:t>13/01/2023</a:t>
+              <a:t>17/05/2023</a:t>
             </a:fld>
             <a:endParaRPr lang="fr-FR"/>
           </a:p>
@@ -2201,7 +2201,7 @@
           </a:lstStyle>
           <a:p>
             <a:r>
-              <a:rPr lang="fr-FR" smtClean="0"/>
+              <a:rPr lang="fr-FR"/>
               <a:t>Modifiez le style du titre</a:t>
             </a:r>
             <a:endParaRPr lang="en-US" dirty="0"/>
@@ -2266,7 +2266,7 @@
           </a:lstStyle>
           <a:p>
             <a:r>
-              <a:rPr lang="fr-FR" smtClean="0"/>
+              <a:rPr lang="fr-FR"/>
               <a:t>Cliquez sur l'icône pour ajouter une image</a:t>
             </a:r>
             <a:endParaRPr lang="en-US" dirty="0"/>
@@ -2332,7 +2332,7 @@
           <a:p>
             <a:pPr lvl="0"/>
             <a:r>
-              <a:rPr lang="fr-FR" smtClean="0"/>
+              <a:rPr lang="fr-FR"/>
               <a:t>Modifier les styles du texte du masque</a:t>
             </a:r>
           </a:p>
@@ -2355,7 +2355,7 @@
           <a:p>
             <a:fld id="{1BB3E4DA-C71C-4ED9-866F-5A0278C77694}" type="datetimeFigureOut">
               <a:rPr lang="fr-FR" smtClean="0"/>
-              <a:t>13/01/2023</a:t>
+              <a:t>17/05/2023</a:t>
             </a:fld>
             <a:endParaRPr lang="fr-FR"/>
           </a:p>
@@ -2464,7 +2464,7 @@
           <a:lstStyle/>
           <a:p>
             <a:r>
-              <a:rPr lang="fr-FR" smtClean="0"/>
+              <a:rPr lang="fr-FR"/>
               <a:t>Modifiez le style du titre</a:t>
             </a:r>
             <a:endParaRPr lang="en-US" dirty="0"/>
@@ -2498,35 +2498,35 @@
           <a:p>
             <a:pPr lvl="0"/>
             <a:r>
-              <a:rPr lang="fr-FR" smtClean="0"/>
+              <a:rPr lang="fr-FR"/>
               <a:t>Modifier les styles du texte du masque</a:t>
             </a:r>
           </a:p>
           <a:p>
             <a:pPr lvl="1"/>
             <a:r>
-              <a:rPr lang="fr-FR" smtClean="0"/>
+              <a:rPr lang="fr-FR"/>
               <a:t>Deuxième niveau</a:t>
             </a:r>
           </a:p>
           <a:p>
             <a:pPr lvl="2"/>
             <a:r>
-              <a:rPr lang="fr-FR" smtClean="0"/>
+              <a:rPr lang="fr-FR"/>
               <a:t>Troisième niveau</a:t>
             </a:r>
           </a:p>
           <a:p>
             <a:pPr lvl="3"/>
             <a:r>
-              <a:rPr lang="fr-FR" smtClean="0"/>
+              <a:rPr lang="fr-FR"/>
               <a:t>Quatrième niveau</a:t>
             </a:r>
           </a:p>
           <a:p>
             <a:pPr lvl="4"/>
             <a:r>
-              <a:rPr lang="fr-FR" smtClean="0"/>
+              <a:rPr lang="fr-FR"/>
               <a:t>Cinquième niveau</a:t>
             </a:r>
             <a:endParaRPr lang="en-US" dirty="0"/>
@@ -2568,7 +2568,7 @@
           <a:p>
             <a:fld id="{1BB3E4DA-C71C-4ED9-866F-5A0278C77694}" type="datetimeFigureOut">
               <a:rPr lang="fr-FR" smtClean="0"/>
-              <a:t>13/01/2023</a:t>
+              <a:t>17/05/2023</a:t>
             </a:fld>
             <a:endParaRPr lang="fr-FR"/>
           </a:p>
@@ -2683,7 +2683,7 @@
               </a:spcAft>
             </a:pPr>
             <a:r>
-              <a:rPr lang="fr-FR" sz="1000" smtClean="0">
+              <a:rPr lang="fr-FR" sz="1000">
                 <a:solidFill>
                   <a:srgbClr val="FF8C00"/>
                 </a:solidFill>
@@ -2691,12 +2691,6 @@
               </a:rPr>
               <a:t>C2 - Confidential</a:t>
             </a:r>
-            <a:endParaRPr lang="fr-FR" sz="1000">
-              <a:solidFill>
-                <a:srgbClr val="FF8C00"/>
-              </a:solidFill>
-              <a:latin typeface="Calibri" panose="020F0502020204030204" pitchFamily="34" charset="0"/>
-            </a:endParaRPr>
           </a:p>
         </p:txBody>
       </p:sp>
@@ -3090,16 +3084,12 @@
           <a:lstStyle/>
           <a:p>
             <a:r>
-              <a:rPr lang="fr-FR" b="1" dirty="0" smtClean="0">
+              <a:rPr lang="fr-FR" b="1" dirty="0">
                 <a:latin typeface="Arial" panose="020B0604020202020204" pitchFamily="34" charset="0"/>
                 <a:cs typeface="Arial" panose="020B0604020202020204" pitchFamily="34" charset="0"/>
               </a:rPr>
               <a:t>Organisation des programmes d’exploration</a:t>
             </a:r>
-            <a:endParaRPr lang="fr-FR" b="1" dirty="0">
-              <a:latin typeface="Arial" panose="020B0604020202020204" pitchFamily="34" charset="0"/>
-              <a:cs typeface="Arial" panose="020B0604020202020204" pitchFamily="34" charset="0"/>
-            </a:endParaRPr>
           </a:p>
         </p:txBody>
       </p:sp>
@@ -3157,7 +3147,7 @@
           <a:p>
             <a:pPr algn="ctr"/>
             <a:r>
-              <a:rPr lang="fr-FR" sz="1400" b="1" u="sng" dirty="0" smtClean="0">
+              <a:rPr lang="fr-FR" sz="1400" b="1" u="sng" dirty="0">
                 <a:latin typeface="Arial" panose="020B0604020202020204" pitchFamily="34" charset="0"/>
                 <a:cs typeface="Arial" panose="020B0604020202020204" pitchFamily="34" charset="0"/>
               </a:rPr>
@@ -3184,7 +3174,7 @@
           <a:p>
             <a:pPr algn="ctr"/>
             <a:r>
-              <a:rPr lang="fr-FR" sz="1400" dirty="0" err="1" smtClean="0">
+              <a:rPr lang="fr-FR" sz="1400" dirty="0" err="1">
                 <a:latin typeface="Arial" panose="020B0604020202020204" pitchFamily="34" charset="0"/>
                 <a:cs typeface="Arial" panose="020B0604020202020204" pitchFamily="34" charset="0"/>
               </a:rPr>
@@ -3221,16 +3211,12 @@
           <a:p>
             <a:pPr algn="ctr"/>
             <a:r>
-              <a:rPr lang="fr-FR" sz="1400" dirty="0" smtClean="0">
+              <a:rPr lang="fr-FR" sz="1400" dirty="0">
                 <a:latin typeface="Arial" panose="020B0604020202020204" pitchFamily="34" charset="0"/>
                 <a:cs typeface="Arial" panose="020B0604020202020204" pitchFamily="34" charset="0"/>
               </a:rPr>
               <a:t>dedicated_script.py</a:t>
             </a:r>
-            <a:endParaRPr lang="fr-FR" sz="1400" dirty="0">
-              <a:latin typeface="Arial" panose="020B0604020202020204" pitchFamily="34" charset="0"/>
-              <a:cs typeface="Arial" panose="020B0604020202020204" pitchFamily="34" charset="0"/>
-            </a:endParaRPr>
           </a:p>
         </p:txBody>
       </p:sp>
@@ -3242,8 +3228,8 @@
         </p:nvSpPr>
         <p:spPr>
           <a:xfrm>
-            <a:off x="5464967" y="1826409"/>
-            <a:ext cx="1845378" cy="523220"/>
+            <a:off x="5961898" y="1826409"/>
+            <a:ext cx="851516" cy="307777"/>
           </a:xfrm>
           <a:prstGeom prst="rect">
             <a:avLst/>
@@ -3257,48 +3243,13 @@
           <a:lstStyle/>
           <a:p>
             <a:pPr algn="ctr"/>
-            <a:r>
-              <a:rPr lang="fr-FR" sz="1400" dirty="0" err="1">
-                <a:latin typeface="Arial" panose="020B0604020202020204" pitchFamily="34" charset="0"/>
-                <a:cs typeface="Arial" panose="020B0604020202020204" pitchFamily="34" charset="0"/>
-              </a:rPr>
-              <a:t>Copied_reports</a:t>
-            </a:r>
-            <a:r>
-              <a:rPr lang="fr-FR" sz="1400" dirty="0" smtClean="0">
-                <a:latin typeface="Arial" panose="020B0604020202020204" pitchFamily="34" charset="0"/>
-                <a:cs typeface="Arial" panose="020B0604020202020204" pitchFamily="34" charset="0"/>
-              </a:rPr>
-              <a:t>_</a:t>
-            </a:r>
-          </a:p>
-          <a:p>
-            <a:pPr algn="ctr"/>
-            <a:r>
-              <a:rPr lang="fr-FR" sz="1400" dirty="0" smtClean="0">
-                <a:latin typeface="Arial" panose="020B0604020202020204" pitchFamily="34" charset="0"/>
-                <a:cs typeface="Arial" panose="020B0604020202020204" pitchFamily="34" charset="0"/>
-              </a:rPr>
-              <a:t>2022_07_19 </a:t>
-            </a:r>
             <a:r>
               <a:rPr lang="fr-FR" sz="1400" dirty="0">
                 <a:latin typeface="Arial" panose="020B0604020202020204" pitchFamily="34" charset="0"/>
                 <a:cs typeface="Arial" panose="020B0604020202020204" pitchFamily="34" charset="0"/>
               </a:rPr>
-              <a:t>- </a:t>
-            </a:r>
-            <a:r>
-              <a:rPr lang="fr-FR" sz="1400" dirty="0" smtClean="0">
-                <a:latin typeface="Arial" panose="020B0604020202020204" pitchFamily="34" charset="0"/>
-                <a:cs typeface="Arial" panose="020B0604020202020204" pitchFamily="34" charset="0"/>
-              </a:rPr>
-              <a:t>v0.csv</a:t>
-            </a:r>
-            <a:endParaRPr lang="fr-FR" sz="1400" dirty="0">
-              <a:latin typeface="Arial" panose="020B0604020202020204" pitchFamily="34" charset="0"/>
-              <a:cs typeface="Arial" panose="020B0604020202020204" pitchFamily="34" charset="0"/>
-            </a:endParaRPr>
+              <a:t>data.csv</a:t>
+            </a:r>
           </a:p>
         </p:txBody>
       </p:sp>
@@ -3440,16 +3391,12 @@
           <a:p>
             <a:pPr algn="ctr"/>
             <a:r>
-              <a:rPr lang="fr-FR" sz="1400" dirty="0" smtClean="0">
+              <a:rPr lang="fr-FR" sz="1400" dirty="0">
                 <a:latin typeface="Arial" panose="020B0604020202020204" pitchFamily="34" charset="0"/>
                 <a:cs typeface="Arial" panose="020B0604020202020204" pitchFamily="34" charset="0"/>
               </a:rPr>
               <a:t>Data</a:t>
             </a:r>
-            <a:endParaRPr lang="fr-FR" sz="1400" dirty="0">
-              <a:latin typeface="Arial" panose="020B0604020202020204" pitchFamily="34" charset="0"/>
-              <a:cs typeface="Arial" panose="020B0604020202020204" pitchFamily="34" charset="0"/>
-            </a:endParaRPr>
           </a:p>
         </p:txBody>
       </p:sp>
@@ -3644,7 +3591,7 @@
           <a:lstStyle/>
           <a:p>
             <a:r>
-              <a:rPr lang="fr-FR" sz="1400" b="1" u="sng" dirty="0" smtClean="0">
+              <a:rPr lang="fr-FR" sz="1400" b="1" u="sng" dirty="0">
                 <a:latin typeface="Arial" panose="020B0604020202020204" pitchFamily="34" charset="0"/>
                 <a:cs typeface="Arial" panose="020B0604020202020204" pitchFamily="34" charset="0"/>
               </a:rPr>
@@ -3653,16 +3600,12 @@
           </a:p>
           <a:p>
             <a:r>
-              <a:rPr lang="fr-FR" sz="1400" b="1" u="sng" dirty="0" smtClean="0">
+              <a:rPr lang="fr-FR" sz="1400" b="1" u="sng" dirty="0">
                 <a:latin typeface="Arial" panose="020B0604020202020204" pitchFamily="34" charset="0"/>
                 <a:cs typeface="Arial" panose="020B0604020202020204" pitchFamily="34" charset="0"/>
               </a:rPr>
               <a:t>dédié</a:t>
             </a:r>
-            <a:endParaRPr lang="fr-FR" sz="1400" b="1" u="sng" dirty="0">
-              <a:latin typeface="Arial" panose="020B0604020202020204" pitchFamily="34" charset="0"/>
-              <a:cs typeface="Arial" panose="020B0604020202020204" pitchFamily="34" charset="0"/>
-            </a:endParaRPr>
           </a:p>
         </p:txBody>
       </p:sp>
@@ -3689,7 +3632,7 @@
           <a:lstStyle/>
           <a:p>
             <a:r>
-              <a:rPr lang="fr-FR" sz="1400" b="1" u="sng" dirty="0" smtClean="0">
+              <a:rPr lang="fr-FR" sz="1400" b="1" u="sng" dirty="0">
                 <a:latin typeface="Arial" panose="020B0604020202020204" pitchFamily="34" charset="0"/>
                 <a:cs typeface="Arial" panose="020B0604020202020204" pitchFamily="34" charset="0"/>
               </a:rPr>
@@ -3698,16 +3641,12 @@
           </a:p>
           <a:p>
             <a:r>
-              <a:rPr lang="fr-FR" sz="1400" b="1" u="sng" dirty="0" smtClean="0">
+              <a:rPr lang="fr-FR" sz="1400" b="1" u="sng" dirty="0">
                 <a:latin typeface="Arial" panose="020B0604020202020204" pitchFamily="34" charset="0"/>
                 <a:cs typeface="Arial" panose="020B0604020202020204" pitchFamily="34" charset="0"/>
               </a:rPr>
               <a:t>standards</a:t>
             </a:r>
-            <a:endParaRPr lang="fr-FR" sz="1400" b="1" u="sng" dirty="0">
-              <a:latin typeface="Arial" panose="020B0604020202020204" pitchFamily="34" charset="0"/>
-              <a:cs typeface="Arial" panose="020B0604020202020204" pitchFamily="34" charset="0"/>
-            </a:endParaRPr>
           </a:p>
         </p:txBody>
       </p:sp>
@@ -3734,16 +3673,12 @@
           <a:lstStyle/>
           <a:p>
             <a:r>
-              <a:rPr lang="fr-FR" sz="1400" b="1" u="sng" dirty="0" smtClean="0">
+              <a:rPr lang="fr-FR" sz="1400" b="1" u="sng" dirty="0">
                 <a:latin typeface="Arial" panose="020B0604020202020204" pitchFamily="34" charset="0"/>
                 <a:cs typeface="Arial" panose="020B0604020202020204" pitchFamily="34" charset="0"/>
               </a:rPr>
               <a:t>Données</a:t>
             </a:r>
-            <a:endParaRPr lang="fr-FR" sz="1400" b="1" u="sng" dirty="0">
-              <a:latin typeface="Arial" panose="020B0604020202020204" pitchFamily="34" charset="0"/>
-              <a:cs typeface="Arial" panose="020B0604020202020204" pitchFamily="34" charset="0"/>
-            </a:endParaRPr>
           </a:p>
         </p:txBody>
       </p:sp>
@@ -3819,7 +3754,7 @@
           <a:p>
             <a:pPr algn="ctr"/>
             <a:r>
-              <a:rPr lang="fr-FR" sz="1400" dirty="0" err="1" smtClean="0">
+              <a:rPr lang="fr-FR" sz="1400" dirty="0" err="1">
                 <a:latin typeface="Arial" panose="020B0604020202020204" pitchFamily="34" charset="0"/>
                 <a:cs typeface="Arial" panose="020B0604020202020204" pitchFamily="34" charset="0"/>
               </a:rPr>
@@ -3938,16 +3873,12 @@
           <a:p>
             <a:pPr algn="ctr"/>
             <a:r>
-              <a:rPr lang="fr-FR" sz="1400" dirty="0" smtClean="0">
+              <a:rPr lang="fr-FR" sz="1400" dirty="0">
                 <a:latin typeface="Arial" panose="020B0604020202020204" pitchFamily="34" charset="0"/>
                 <a:cs typeface="Arial" panose="020B0604020202020204" pitchFamily="34" charset="0"/>
               </a:rPr>
               <a:t>std_ml.py</a:t>
             </a:r>
-            <a:endParaRPr lang="fr-FR" sz="1400" dirty="0">
-              <a:latin typeface="Arial" panose="020B0604020202020204" pitchFamily="34" charset="0"/>
-              <a:cs typeface="Arial" panose="020B0604020202020204" pitchFamily="34" charset="0"/>
-            </a:endParaRPr>
           </a:p>
         </p:txBody>
       </p:sp>
@@ -3975,16 +3906,12 @@
           <a:p>
             <a:pPr algn="ctr"/>
             <a:r>
-              <a:rPr lang="fr-FR" sz="1400" dirty="0" smtClean="0">
+              <a:rPr lang="fr-FR" sz="1400" dirty="0">
                 <a:latin typeface="Arial" panose="020B0604020202020204" pitchFamily="34" charset="0"/>
                 <a:cs typeface="Arial" panose="020B0604020202020204" pitchFamily="34" charset="0"/>
               </a:rPr>
               <a:t>std_q7</a:t>
             </a:r>
-            <a:endParaRPr lang="fr-FR" sz="1400" dirty="0">
-              <a:latin typeface="Arial" panose="020B0604020202020204" pitchFamily="34" charset="0"/>
-              <a:cs typeface="Arial" panose="020B0604020202020204" pitchFamily="34" charset="0"/>
-            </a:endParaRPr>
           </a:p>
         </p:txBody>
       </p:sp>
@@ -4094,16 +4021,12 @@
           <a:p>
             <a:pPr algn="ctr"/>
             <a:r>
-              <a:rPr lang="fr-FR" sz="1400" dirty="0" smtClean="0">
+              <a:rPr lang="fr-FR" sz="1400" dirty="0">
                 <a:latin typeface="Arial" panose="020B0604020202020204" pitchFamily="34" charset="0"/>
                 <a:cs typeface="Arial" panose="020B0604020202020204" pitchFamily="34" charset="0"/>
               </a:rPr>
               <a:t>std_q7.py</a:t>
             </a:r>
-            <a:endParaRPr lang="fr-FR" sz="1400" dirty="0">
-              <a:latin typeface="Arial" panose="020B0604020202020204" pitchFamily="34" charset="0"/>
-              <a:cs typeface="Arial" panose="020B0604020202020204" pitchFamily="34" charset="0"/>
-            </a:endParaRPr>
           </a:p>
         </p:txBody>
       </p:sp>
@@ -4321,8 +4244,8 @@
         </p:nvSpPr>
         <p:spPr>
           <a:xfrm>
-            <a:off x="4949200" y="1051560"/>
-            <a:ext cx="4133840" cy="3129467"/>
+            <a:off x="6408225" y="1739855"/>
+            <a:ext cx="2315448" cy="1752878"/>
           </a:xfrm>
           <a:prstGeom prst="roundRect">
             <a:avLst>
@@ -4502,19 +4425,8 @@
                 <a:latin typeface="Arial" panose="020B0604020202020204" pitchFamily="34" charset="0"/>
                 <a:cs typeface="Arial" panose="020B0604020202020204" pitchFamily="34" charset="0"/>
               </a:rPr>
-              <a:t> </a:t>
-            </a:r>
-            <a:r>
-              <a:rPr lang="fr-FR" b="1" dirty="0" smtClean="0">
-                <a:latin typeface="Arial" panose="020B0604020202020204" pitchFamily="34" charset="0"/>
-                <a:cs typeface="Arial" panose="020B0604020202020204" pitchFamily="34" charset="0"/>
-              </a:rPr>
-              <a:t>»</a:t>
-            </a:r>
-            <a:endParaRPr lang="fr-FR" b="1" dirty="0">
-              <a:latin typeface="Arial" panose="020B0604020202020204" pitchFamily="34" charset="0"/>
-              <a:cs typeface="Arial" panose="020B0604020202020204" pitchFamily="34" charset="0"/>
-            </a:endParaRPr>
+              <a:t> »</a:t>
+            </a:r>
           </a:p>
         </p:txBody>
       </p:sp>
@@ -4572,14 +4484,14 @@
           <a:p>
             <a:pPr algn="ctr"/>
             <a:r>
-              <a:rPr lang="fr-FR" sz="1400" dirty="0" err="1" smtClean="0">
+              <a:rPr lang="fr-FR" sz="1400" dirty="0" err="1">
                 <a:latin typeface="Arial" panose="020B0604020202020204" pitchFamily="34" charset="0"/>
                 <a:cs typeface="Arial" panose="020B0604020202020204" pitchFamily="34" charset="0"/>
               </a:rPr>
               <a:t>source_data</a:t>
             </a:r>
             <a:r>
-              <a:rPr lang="fr-FR" sz="1400" dirty="0" smtClean="0">
+              <a:rPr lang="fr-FR" sz="1400" dirty="0">
                 <a:latin typeface="Arial" panose="020B0604020202020204" pitchFamily="34" charset="0"/>
                 <a:cs typeface="Arial" panose="020B0604020202020204" pitchFamily="34" charset="0"/>
               </a:rPr>
@@ -4589,7 +4501,7 @@
           <a:p>
             <a:pPr algn="ctr"/>
             <a:r>
-              <a:rPr lang="fr-FR" sz="1400" dirty="0" err="1" smtClean="0">
+              <a:rPr lang="fr-FR" sz="1400" dirty="0" err="1">
                 <a:latin typeface="Arial" panose="020B0604020202020204" pitchFamily="34" charset="0"/>
                 <a:cs typeface="Arial" panose="020B0604020202020204" pitchFamily="34" charset="0"/>
               </a:rPr>
@@ -4666,7 +4578,7 @@
         </p:blipFill>
         <p:spPr bwMode="auto">
           <a:xfrm>
-            <a:off x="6632131" y="1127655"/>
+            <a:off x="7181960" y="1964673"/>
             <a:ext cx="811420" cy="811420"/>
           </a:xfrm>
           <a:prstGeom prst="rect">
@@ -4686,29 +4598,6 @@
       </p:pic>
       <p:pic>
         <p:nvPicPr>
-          <p:cNvPr id="3" name="Image 2"/>
-          <p:cNvPicPr>
-            <a:picLocks noChangeAspect="1"/>
-          </p:cNvPicPr>
-          <p:nvPr/>
-        </p:nvPicPr>
-        <p:blipFill rotWithShape="1">
-          <a:blip r:embed="rId5"/>
-          <a:srcRect l="9096"/>
-          <a:stretch/>
-        </p:blipFill>
-        <p:spPr>
-          <a:xfrm>
-            <a:off x="5186522" y="2379274"/>
-            <a:ext cx="3702637" cy="1613641"/>
-          </a:xfrm>
-          <a:prstGeom prst="rect">
-            <a:avLst/>
-          </a:prstGeom>
-        </p:spPr>
-      </p:pic>
-      <p:pic>
-        <p:nvPicPr>
           <p:cNvPr id="5" name="Image 4"/>
           <p:cNvPicPr>
             <a:picLocks noChangeAspect="1"/>
@@ -4716,7 +4605,7 @@
           <p:nvPr/>
         </p:nvPicPr>
         <p:blipFill>
-          <a:blip r:embed="rId6"/>
+          <a:blip r:embed="rId5"/>
           <a:stretch>
             <a:fillRect/>
           </a:stretch>
@@ -4818,56 +4707,6 @@
           </a:effectRef>
           <a:fontRef idx="minor">
             <a:schemeClr val="accent4"/>
-          </a:fontRef>
-        </p:style>
-        <p:txBody>
-          <a:bodyPr rtlCol="0" anchor="ctr"/>
-          <a:lstStyle/>
-          <a:p>
-            <a:pPr algn="ctr"/>
-            <a:endParaRPr lang="fr-FR"/>
-          </a:p>
-        </p:txBody>
-      </p:sp>
-      <p:sp>
-        <p:nvSpPr>
-          <p:cNvPr id="52" name="Rectangle à coins arrondis 51"/>
-          <p:cNvSpPr/>
-          <p:nvPr/>
-        </p:nvSpPr>
-        <p:spPr>
-          <a:xfrm>
-            <a:off x="5078232" y="2320796"/>
-            <a:ext cx="3934031" cy="1801753"/>
-          </a:xfrm>
-          <a:prstGeom prst="roundRect">
-            <a:avLst>
-              <a:gd name="adj" fmla="val 7229"/>
-            </a:avLst>
-          </a:prstGeom>
-          <a:noFill/>
-          <a:ln w="38100" cap="flat" cmpd="sng" algn="ctr">
-            <a:solidFill>
-              <a:schemeClr val="accent2"/>
-            </a:solidFill>
-            <a:prstDash val="solid"/>
-            <a:round/>
-            <a:headEnd type="none" w="med" len="med"/>
-            <a:tailEnd type="none" w="med" len="med"/>
-          </a:ln>
-        </p:spPr>
-        <p:style>
-          <a:lnRef idx="0">
-            <a:scrgbClr r="0" g="0" b="0"/>
-          </a:lnRef>
-          <a:fillRef idx="0">
-            <a:scrgbClr r="0" g="0" b="0"/>
-          </a:fillRef>
-          <a:effectRef idx="0">
-            <a:scrgbClr r="0" g="0" b="0"/>
-          </a:effectRef>
-          <a:fontRef idx="minor">
-            <a:schemeClr val="accent2"/>
           </a:fontRef>
         </p:style>
         <p:txBody>
@@ -4964,13 +4803,16 @@
       <p:cxnSp>
         <p:nvCxnSpPr>
           <p:cNvPr id="54" name="Connecteur droit avec flèche 53"/>
-          <p:cNvCxnSpPr/>
+          <p:cNvCxnSpPr>
+            <a:cxnSpLocks/>
+            <a:stCxn id="67" idx="2"/>
+          </p:cNvCxnSpPr>
           <p:nvPr/>
         </p:nvCxnSpPr>
         <p:spPr>
           <a:xfrm flipH="1">
-            <a:off x="7443551" y="4181027"/>
-            <a:ext cx="471929" cy="1266627"/>
+            <a:off x="7359805" y="3492733"/>
+            <a:ext cx="206144" cy="1937911"/>
           </a:xfrm>
           <a:prstGeom prst="straightConnector1">
             <a:avLst/>
@@ -5023,21 +4865,21 @@
           <a:lstStyle/>
           <a:p>
             <a:r>
-              <a:rPr lang="fr-FR" sz="1400" dirty="0" smtClean="0">
+              <a:rPr lang="fr-FR" sz="1400" dirty="0">
                 <a:latin typeface="Arial" panose="020B0604020202020204" pitchFamily="34" charset="0"/>
                 <a:cs typeface="Arial" panose="020B0604020202020204" pitchFamily="34" charset="0"/>
               </a:rPr>
               <a:t>→ Le « </a:t>
             </a:r>
             <a:r>
-              <a:rPr lang="fr-FR" sz="1400" i="1" dirty="0" smtClean="0">
+              <a:rPr lang="fr-FR" sz="1400" i="1" dirty="0">
                 <a:latin typeface="Arial" panose="020B0604020202020204" pitchFamily="34" charset="0"/>
                 <a:cs typeface="Arial" panose="020B0604020202020204" pitchFamily="34" charset="0"/>
               </a:rPr>
               <a:t>Model</a:t>
             </a:r>
             <a:r>
-              <a:rPr lang="fr-FR" sz="1400" dirty="0" smtClean="0">
+              <a:rPr lang="fr-FR" sz="1400" dirty="0">
                 <a:latin typeface="Arial" panose="020B0604020202020204" pitchFamily="34" charset="0"/>
                 <a:cs typeface="Arial" panose="020B0604020202020204" pitchFamily="34" charset="0"/>
               </a:rPr>
@@ -5046,16 +4888,12 @@
           </a:p>
           <a:p>
             <a:r>
-              <a:rPr lang="fr-FR" sz="1400" dirty="0" smtClean="0">
+              <a:rPr lang="fr-FR" sz="1400" dirty="0">
                 <a:latin typeface="Arial" panose="020B0604020202020204" pitchFamily="34" charset="0"/>
                 <a:cs typeface="Arial" panose="020B0604020202020204" pitchFamily="34" charset="0"/>
               </a:rPr>
               <a:t>mais le programme qui va interroger la base de données.</a:t>
             </a:r>
-            <a:endParaRPr lang="fr-FR" sz="1400" dirty="0">
-              <a:latin typeface="Arial" panose="020B0604020202020204" pitchFamily="34" charset="0"/>
-              <a:cs typeface="Arial" panose="020B0604020202020204" pitchFamily="34" charset="0"/>
-            </a:endParaRPr>
           </a:p>
         </p:txBody>
       </p:sp>
@@ -5067,7 +4905,7 @@
         </p:nvSpPr>
         <p:spPr>
           <a:xfrm>
-            <a:off x="6174462" y="1941607"/>
+            <a:off x="6724291" y="2778625"/>
             <a:ext cx="1726755" cy="307777"/>
           </a:xfrm>
           <a:prstGeom prst="rect">
@@ -5083,16 +4921,12 @@
           <a:p>
             <a:pPr algn="ctr"/>
             <a:r>
-              <a:rPr lang="fr-FR" sz="1400" dirty="0" smtClean="0">
+              <a:rPr lang="fr-FR" sz="1400" dirty="0">
                 <a:latin typeface="Arial" panose="020B0604020202020204" pitchFamily="34" charset="0"/>
                 <a:cs typeface="Arial" panose="020B0604020202020204" pitchFamily="34" charset="0"/>
               </a:rPr>
               <a:t>dedicated_script.py</a:t>
             </a:r>
-            <a:endParaRPr lang="fr-FR" sz="1400" dirty="0">
-              <a:latin typeface="Arial" panose="020B0604020202020204" pitchFamily="34" charset="0"/>
-              <a:cs typeface="Arial" panose="020B0604020202020204" pitchFamily="34" charset="0"/>
-            </a:endParaRPr>
           </a:p>
         </p:txBody>
       </p:sp>
@@ -5197,7 +5031,7 @@
           <a:lstStyle/>
           <a:p>
             <a:r>
-              <a:rPr lang="fr-FR" b="1" dirty="0" smtClean="0">
+              <a:rPr lang="fr-FR" b="1" dirty="0">
                 <a:latin typeface="Arial" panose="020B0604020202020204" pitchFamily="34" charset="0"/>
                 <a:cs typeface="Arial" panose="020B0604020202020204" pitchFamily="34" charset="0"/>
               </a:rPr>
@@ -5264,7 +5098,7 @@
           <a:p>
             <a:pPr algn="ctr"/>
             <a:r>
-              <a:rPr lang="fr-FR" sz="1400" dirty="0" err="1" smtClean="0">
+              <a:rPr lang="fr-FR" sz="1400" dirty="0" err="1">
                 <a:latin typeface="Arial" panose="020B0604020202020204" pitchFamily="34" charset="0"/>
                 <a:cs typeface="Arial" panose="020B0604020202020204" pitchFamily="34" charset="0"/>
               </a:rPr>
@@ -5383,16 +5217,12 @@
           <a:p>
             <a:pPr algn="ctr"/>
             <a:r>
-              <a:rPr lang="fr-FR" sz="1400" dirty="0" smtClean="0">
+              <a:rPr lang="fr-FR" sz="1400" dirty="0">
                 <a:latin typeface="Arial" panose="020B0604020202020204" pitchFamily="34" charset="0"/>
                 <a:cs typeface="Arial" panose="020B0604020202020204" pitchFamily="34" charset="0"/>
               </a:rPr>
               <a:t>std_ml.py</a:t>
             </a:r>
-            <a:endParaRPr lang="fr-FR" sz="1400" dirty="0">
-              <a:latin typeface="Arial" panose="020B0604020202020204" pitchFamily="34" charset="0"/>
-              <a:cs typeface="Arial" panose="020B0604020202020204" pitchFamily="34" charset="0"/>
-            </a:endParaRPr>
           </a:p>
         </p:txBody>
       </p:sp>
@@ -5420,16 +5250,12 @@
           <a:p>
             <a:pPr algn="ctr"/>
             <a:r>
-              <a:rPr lang="fr-FR" sz="1400" dirty="0" smtClean="0">
+              <a:rPr lang="fr-FR" sz="1400" dirty="0">
                 <a:latin typeface="Arial" panose="020B0604020202020204" pitchFamily="34" charset="0"/>
                 <a:cs typeface="Arial" panose="020B0604020202020204" pitchFamily="34" charset="0"/>
               </a:rPr>
               <a:t>std_q7</a:t>
             </a:r>
-            <a:endParaRPr lang="fr-FR" sz="1400" dirty="0">
-              <a:latin typeface="Arial" panose="020B0604020202020204" pitchFamily="34" charset="0"/>
-              <a:cs typeface="Arial" panose="020B0604020202020204" pitchFamily="34" charset="0"/>
-            </a:endParaRPr>
           </a:p>
         </p:txBody>
       </p:sp>
@@ -5539,16 +5365,12 @@
           <a:p>
             <a:pPr algn="ctr"/>
             <a:r>
-              <a:rPr lang="fr-FR" sz="1400" dirty="0" smtClean="0">
+              <a:rPr lang="fr-FR" sz="1400" dirty="0">
                 <a:latin typeface="Arial" panose="020B0604020202020204" pitchFamily="34" charset="0"/>
                 <a:cs typeface="Arial" panose="020B0604020202020204" pitchFamily="34" charset="0"/>
               </a:rPr>
               <a:t>std_q7.py</a:t>
             </a:r>
-            <a:endParaRPr lang="fr-FR" sz="1400" dirty="0">
-              <a:latin typeface="Arial" panose="020B0604020202020204" pitchFamily="34" charset="0"/>
-              <a:cs typeface="Arial" panose="020B0604020202020204" pitchFamily="34" charset="0"/>
-            </a:endParaRPr>
           </a:p>
         </p:txBody>
       </p:sp>
@@ -5774,16 +5596,12 @@
           <a:p>
             <a:pPr algn="ctr"/>
             <a:r>
-              <a:rPr lang="fr-FR" sz="1400" b="1" dirty="0" smtClean="0">
+              <a:rPr lang="fr-FR" sz="1400" b="1" dirty="0">
                 <a:latin typeface="Arial" panose="020B0604020202020204" pitchFamily="34" charset="0"/>
                 <a:cs typeface="Arial" panose="020B0604020202020204" pitchFamily="34" charset="0"/>
               </a:rPr>
               <a:t>std_ml.py</a:t>
             </a:r>
-            <a:endParaRPr lang="fr-FR" sz="1400" b="1" dirty="0">
-              <a:latin typeface="Arial" panose="020B0604020202020204" pitchFamily="34" charset="0"/>
-              <a:cs typeface="Arial" panose="020B0604020202020204" pitchFamily="34" charset="0"/>
-            </a:endParaRPr>
           </a:p>
         </p:txBody>
       </p:sp>
@@ -5811,16 +5629,12 @@
           <a:p>
             <a:pPr algn="ctr"/>
             <a:r>
-              <a:rPr lang="fr-FR" sz="1400" b="1" dirty="0" smtClean="0">
+              <a:rPr lang="fr-FR" sz="1400" b="1" dirty="0">
                 <a:latin typeface="Arial" panose="020B0604020202020204" pitchFamily="34" charset="0"/>
                 <a:cs typeface="Arial" panose="020B0604020202020204" pitchFamily="34" charset="0"/>
               </a:rPr>
               <a:t>std_q7.py</a:t>
             </a:r>
-            <a:endParaRPr lang="fr-FR" sz="1400" b="1" dirty="0">
-              <a:latin typeface="Arial" panose="020B0604020202020204" pitchFamily="34" charset="0"/>
-              <a:cs typeface="Arial" panose="020B0604020202020204" pitchFamily="34" charset="0"/>
-            </a:endParaRPr>
           </a:p>
         </p:txBody>
       </p:sp>

</xml_diff>